<commit_message>
Testing CNN3D and LSTM
preparing everything for try CNN3D+LSTM
</commit_message>
<xml_diff>
--- a/version actualizada(para presentacion)/SIGNBUDDY/SIGNBUDDY/SIGNBUDDY PITCH DE VENTA.pptx
+++ b/version actualizada(para presentacion)/SIGNBUDDY/SIGNBUDDY/SIGNBUDDY PITCH DE VENTA.pptx
@@ -5,22 +5,21 @@
     <p:sldMasterId id="2147483648" r:id="rId4"/>
   </p:sldMasterIdLst>
   <p:notesMasterIdLst>
-    <p:notesMasterId r:id="rId13"/>
+    <p:notesMasterId r:id="rId12"/>
   </p:notesMasterIdLst>
   <p:sldIdLst>
     <p:sldId id="256" r:id="rId5"/>
     <p:sldId id="257" r:id="rId6"/>
-    <p:sldId id="263" r:id="rId7"/>
-    <p:sldId id="258" r:id="rId8"/>
-    <p:sldId id="265" r:id="rId9"/>
-    <p:sldId id="259" r:id="rId10"/>
-    <p:sldId id="261" r:id="rId11"/>
-    <p:sldId id="260" r:id="rId12"/>
+    <p:sldId id="258" r:id="rId7"/>
+    <p:sldId id="265" r:id="rId8"/>
+    <p:sldId id="259" r:id="rId9"/>
+    <p:sldId id="261" r:id="rId10"/>
+    <p:sldId id="260" r:id="rId11"/>
   </p:sldIdLst>
   <p:sldSz cx="9902825" cy="6858000"/>
   <p:notesSz cx="6858000" cy="9144000"/>
   <p:custDataLst>
-    <p:tags r:id="rId14"/>
+    <p:tags r:id="rId13"/>
   </p:custDataLst>
   <p:defaultTextStyle>
     <a:defPPr marR="0" lvl="0" algn="l" rtl="0">
@@ -267,7 +266,7 @@
       </p15:sldGuideLst>
     </p:ext>
     <p:ext uri="http://customooxmlschemas.google.com/">
-      <go:slidesCustomData xmlns="" xmlns:mc="http://schemas.openxmlformats.org/markup-compatibility/2006" xmlns:mv="urn:schemas-microsoft-com:mac:vml" xmlns:c="http://schemas.openxmlformats.org/drawingml/2006/chart" xmlns:dgm="http://schemas.openxmlformats.org/drawingml/2006/diagram" xmlns:o="urn:schemas-microsoft-com:office:office" xmlns:v="urn:schemas-microsoft-com:vml" xmlns:pvml="urn:schemas-microsoft-com:office:powerpoint" xmlns:com="http://schemas.openxmlformats.org/drawingml/2006/compatibility" xmlns:p14="http://schemas.microsoft.com/office/powerpoint/2010/main" xmlns:p15="http://schemas.microsoft.com/office/powerpoint/2012/main" xmlns:ahyp="http://schemas.microsoft.com/office/drawing/2018/hyperlinkcolor" xmlns:go="http://customooxmlschemas.google.com/" r:id="rId15" roundtripDataSignature="AMtx7mgzVOCuRa2lmBSldHvyNdTeCm17Yw=="/>
+      <go:slidesCustomData xmlns:go="http://customooxmlschemas.google.com/" xmlns:ahyp="http://schemas.microsoft.com/office/drawing/2018/hyperlinkcolor" xmlns:p15="http://schemas.microsoft.com/office/powerpoint/2012/main" xmlns:p14="http://schemas.microsoft.com/office/powerpoint/2010/main" xmlns:com="http://schemas.openxmlformats.org/drawingml/2006/compatibility" xmlns:pvml="urn:schemas-microsoft-com:office:powerpoint" xmlns:v="urn:schemas-microsoft-com:vml" xmlns:o="urn:schemas-microsoft-com:office:office" xmlns:dgm="http://schemas.openxmlformats.org/drawingml/2006/diagram" xmlns:c="http://schemas.openxmlformats.org/drawingml/2006/chart" xmlns:mv="urn:schemas-microsoft-com:mac:vml" xmlns:mc="http://schemas.openxmlformats.org/markup-compatibility/2006" xmlns="" r:id="rId15" roundtripDataSignature="AMtx7mgzVOCuRa2lmBSldHvyNdTeCm17Yw=="/>
     </p:ext>
   </p:extLst>
 </p:presentation>
@@ -1687,7 +1686,7 @@
   <p:cSld>
     <p:spTree>
       <p:nvGrpSpPr>
-        <p:cNvPr id="1" name="Shape 57"/>
+        <p:cNvPr id="1" name="Shape 63"/>
         <p:cNvGrpSpPr/>
         <p:nvPr/>
       </p:nvGrpSpPr>
@@ -1701,45 +1700,7 @@
       </p:grpSpPr>
       <p:sp>
         <p:nvSpPr>
-          <p:cNvPr id="58" name="Google Shape;58;p2:notes"/>
-          <p:cNvSpPr txBox="1">
-            <a:spLocks noGrp="1"/>
-          </p:cNvSpPr>
-          <p:nvPr>
-            <p:ph type="body" idx="1"/>
-          </p:nvPr>
-        </p:nvSpPr>
-        <p:spPr>
-          <a:xfrm>
-            <a:off x="685800" y="4400550"/>
-            <a:ext cx="5486400" cy="3600450"/>
-          </a:xfrm>
-          <a:prstGeom prst="rect">
-            <a:avLst/>
-          </a:prstGeom>
-        </p:spPr>
-        <p:txBody>
-          <a:bodyPr spcFirstLastPara="1" wrap="square" lIns="91425" tIns="45700" rIns="91425" bIns="45700" anchor="t" anchorCtr="0">
-            <a:noAutofit/>
-          </a:bodyPr>
-          <a:lstStyle/>
-          <a:p>
-            <a:pPr marL="0" lvl="0" indent="0" algn="l" rtl="0">
-              <a:spcBef>
-                <a:spcPts val="0"/>
-              </a:spcBef>
-              <a:spcAft>
-                <a:spcPts val="0"/>
-              </a:spcAft>
-              <a:buNone/>
-            </a:pPr>
-            <a:endParaRPr/>
-          </a:p>
-        </p:txBody>
-      </p:sp>
-      <p:sp>
-        <p:nvSpPr>
-          <p:cNvPr id="59" name="Google Shape;59;p2:notes"/>
+          <p:cNvPr id="64" name="Google Shape;64;p3:notes"/>
           <p:cNvSpPr>
             <a:spLocks noGrp="1" noRot="1" noChangeAspect="1"/>
           </p:cNvSpPr>
@@ -1776,14 +1737,111 @@
               </a:path>
             </a:pathLst>
           </a:custGeom>
+          <a:noFill/>
+          <a:ln w="12700" cap="flat" cmpd="sng">
+            <a:solidFill>
+              <a:srgbClr val="000000"/>
+            </a:solidFill>
+            <a:prstDash val="solid"/>
+            <a:round/>
+            <a:headEnd type="none" w="sm" len="sm"/>
+            <a:tailEnd type="none" w="sm" len="sm"/>
+          </a:ln>
         </p:spPr>
       </p:sp>
+      <p:sp>
+        <p:nvSpPr>
+          <p:cNvPr id="65" name="Google Shape;65;p3:notes"/>
+          <p:cNvSpPr txBox="1">
+            <a:spLocks noGrp="1"/>
+          </p:cNvSpPr>
+          <p:nvPr>
+            <p:ph type="body" idx="1"/>
+          </p:nvPr>
+        </p:nvSpPr>
+        <p:spPr>
+          <a:xfrm>
+            <a:off x="685800" y="4400550"/>
+            <a:ext cx="5486400" cy="3600450"/>
+          </a:xfrm>
+          <a:prstGeom prst="rect">
+            <a:avLst/>
+          </a:prstGeom>
+          <a:noFill/>
+          <a:ln>
+            <a:noFill/>
+          </a:ln>
+        </p:spPr>
+        <p:txBody>
+          <a:bodyPr spcFirstLastPara="1" wrap="square" lIns="91425" tIns="45700" rIns="91425" bIns="45700" anchor="t" anchorCtr="0">
+            <a:noAutofit/>
+          </a:bodyPr>
+          <a:lstStyle/>
+          <a:p>
+            <a:pPr marL="0" lvl="0" indent="0" algn="l" rtl="0">
+              <a:spcBef>
+                <a:spcPts val="0"/>
+              </a:spcBef>
+              <a:spcAft>
+                <a:spcPts val="0"/>
+              </a:spcAft>
+              <a:buNone/>
+            </a:pPr>
+            <a:r>
+              <a:rPr lang="en-US"/>
+              <a:t>Note:</a:t>
+            </a:r>
+            <a:endParaRPr/>
+          </a:p>
+        </p:txBody>
+      </p:sp>
+      <p:sp>
+        <p:nvSpPr>
+          <p:cNvPr id="66" name="Google Shape;66;p3:notes"/>
+          <p:cNvSpPr txBox="1">
+            <a:spLocks noGrp="1"/>
+          </p:cNvSpPr>
+          <p:nvPr>
+            <p:ph type="sldNum" idx="12"/>
+          </p:nvPr>
+        </p:nvSpPr>
+        <p:spPr>
+          <a:xfrm>
+            <a:off x="3884613" y="8685213"/>
+            <a:ext cx="2971800" cy="458787"/>
+          </a:xfrm>
+          <a:prstGeom prst="rect">
+            <a:avLst/>
+          </a:prstGeom>
+          <a:noFill/>
+          <a:ln>
+            <a:noFill/>
+          </a:ln>
+        </p:spPr>
+        <p:txBody>
+          <a:bodyPr spcFirstLastPara="1" wrap="square" lIns="91425" tIns="45700" rIns="91425" bIns="45700" anchor="b" anchorCtr="0">
+            <a:noAutofit/>
+          </a:bodyPr>
+          <a:lstStyle/>
+          <a:p>
+            <a:pPr marL="0" lvl="0" indent="0" algn="r" rtl="0">
+              <a:spcBef>
+                <a:spcPts val="0"/>
+              </a:spcBef>
+              <a:spcAft>
+                <a:spcPts val="0"/>
+              </a:spcAft>
+              <a:buNone/>
+            </a:pPr>
+            <a:fld id="{00000000-1234-1234-1234-123412341234}" type="slidenum">
+              <a:rPr lang="en-US"/>
+              <a:t>3</a:t>
+            </a:fld>
+            <a:endParaRPr/>
+          </a:p>
+        </p:txBody>
+      </p:sp>
     </p:spTree>
-    <p:extLst>
-      <p:ext uri="{BB962C8B-B14F-4D97-AF65-F5344CB8AC3E}">
-        <p14:creationId xmlns:p14="http://schemas.microsoft.com/office/powerpoint/2010/main" val="2320382278"/>
-      </p:ext>
-    </p:extLst>
   </p:cSld>
   <p:clrMapOvr>
     <a:masterClrMapping/>
@@ -1952,174 +2010,6 @@
         </p:txBody>
       </p:sp>
     </p:spTree>
-  </p:cSld>
-  <p:clrMapOvr>
-    <a:masterClrMapping/>
-  </p:clrMapOvr>
-</p:notes>
-</file>
-
-<file path=ppt/notesSlides/notesSlide5.xml><?xml version="1.0" encoding="utf-8"?>
-<p:notes xmlns:a="http://schemas.openxmlformats.org/drawingml/2006/main" xmlns:r="http://schemas.openxmlformats.org/officeDocument/2006/relationships" xmlns:p="http://schemas.openxmlformats.org/presentationml/2006/main" showMasterSp="0" showMasterPhAnim="0">
-  <p:cSld>
-    <p:spTree>
-      <p:nvGrpSpPr>
-        <p:cNvPr id="1" name="Shape 63"/>
-        <p:cNvGrpSpPr/>
-        <p:nvPr/>
-      </p:nvGrpSpPr>
-      <p:grpSpPr>
-        <a:xfrm>
-          <a:off x="0" y="0"/>
-          <a:ext cx="0" cy="0"/>
-          <a:chOff x="0" y="0"/>
-          <a:chExt cx="0" cy="0"/>
-        </a:xfrm>
-      </p:grpSpPr>
-      <p:sp>
-        <p:nvSpPr>
-          <p:cNvPr id="64" name="Google Shape;64;p3:notes"/>
-          <p:cNvSpPr>
-            <a:spLocks noGrp="1" noRot="1" noChangeAspect="1"/>
-          </p:cNvSpPr>
-          <p:nvPr>
-            <p:ph type="sldImg" idx="2"/>
-          </p:nvPr>
-        </p:nvSpPr>
-        <p:spPr>
-          <a:xfrm>
-            <a:off x="1200150" y="1143000"/>
-            <a:ext cx="4457700" cy="3086100"/>
-          </a:xfrm>
-          <a:custGeom>
-            <a:avLst/>
-            <a:gdLst/>
-            <a:ahLst/>
-            <a:cxnLst/>
-            <a:rect l="l" t="t" r="r" b="b"/>
-            <a:pathLst>
-              <a:path w="120000" h="120000" extrusionOk="0">
-                <a:moveTo>
-                  <a:pt x="0" y="0"/>
-                </a:moveTo>
-                <a:lnTo>
-                  <a:pt x="120000" y="0"/>
-                </a:lnTo>
-                <a:lnTo>
-                  <a:pt x="120000" y="120000"/>
-                </a:lnTo>
-                <a:lnTo>
-                  <a:pt x="0" y="120000"/>
-                </a:lnTo>
-                <a:close/>
-              </a:path>
-            </a:pathLst>
-          </a:custGeom>
-          <a:noFill/>
-          <a:ln w="12700" cap="flat" cmpd="sng">
-            <a:solidFill>
-              <a:srgbClr val="000000"/>
-            </a:solidFill>
-            <a:prstDash val="solid"/>
-            <a:round/>
-            <a:headEnd type="none" w="sm" len="sm"/>
-            <a:tailEnd type="none" w="sm" len="sm"/>
-          </a:ln>
-        </p:spPr>
-      </p:sp>
-      <p:sp>
-        <p:nvSpPr>
-          <p:cNvPr id="65" name="Google Shape;65;p3:notes"/>
-          <p:cNvSpPr txBox="1">
-            <a:spLocks noGrp="1"/>
-          </p:cNvSpPr>
-          <p:nvPr>
-            <p:ph type="body" idx="1"/>
-          </p:nvPr>
-        </p:nvSpPr>
-        <p:spPr>
-          <a:xfrm>
-            <a:off x="685800" y="4400550"/>
-            <a:ext cx="5486400" cy="3600450"/>
-          </a:xfrm>
-          <a:prstGeom prst="rect">
-            <a:avLst/>
-          </a:prstGeom>
-          <a:noFill/>
-          <a:ln>
-            <a:noFill/>
-          </a:ln>
-        </p:spPr>
-        <p:txBody>
-          <a:bodyPr spcFirstLastPara="1" wrap="square" lIns="91425" tIns="45700" rIns="91425" bIns="45700" anchor="t" anchorCtr="0">
-            <a:noAutofit/>
-          </a:bodyPr>
-          <a:lstStyle/>
-          <a:p>
-            <a:pPr marL="0" lvl="0" indent="0" algn="l" rtl="0">
-              <a:spcBef>
-                <a:spcPts val="0"/>
-              </a:spcBef>
-              <a:spcAft>
-                <a:spcPts val="0"/>
-              </a:spcAft>
-              <a:buNone/>
-            </a:pPr>
-            <a:r>
-              <a:rPr lang="en-US"/>
-              <a:t>Note:</a:t>
-            </a:r>
-            <a:endParaRPr/>
-          </a:p>
-        </p:txBody>
-      </p:sp>
-      <p:sp>
-        <p:nvSpPr>
-          <p:cNvPr id="66" name="Google Shape;66;p3:notes"/>
-          <p:cNvSpPr txBox="1">
-            <a:spLocks noGrp="1"/>
-          </p:cNvSpPr>
-          <p:nvPr>
-            <p:ph type="sldNum" idx="12"/>
-          </p:nvPr>
-        </p:nvSpPr>
-        <p:spPr>
-          <a:xfrm>
-            <a:off x="3884613" y="8685213"/>
-            <a:ext cx="2971800" cy="458787"/>
-          </a:xfrm>
-          <a:prstGeom prst="rect">
-            <a:avLst/>
-          </a:prstGeom>
-          <a:noFill/>
-          <a:ln>
-            <a:noFill/>
-          </a:ln>
-        </p:spPr>
-        <p:txBody>
-          <a:bodyPr spcFirstLastPara="1" wrap="square" lIns="91425" tIns="45700" rIns="91425" bIns="45700" anchor="b" anchorCtr="0">
-            <a:noAutofit/>
-          </a:bodyPr>
-          <a:lstStyle/>
-          <a:p>
-            <a:pPr marL="0" lvl="0" indent="0" algn="r" rtl="0">
-              <a:spcBef>
-                <a:spcPts val="0"/>
-              </a:spcBef>
-              <a:spcAft>
-                <a:spcPts val="0"/>
-              </a:spcAft>
-              <a:buNone/>
-            </a:pPr>
-            <a:fld id="{00000000-1234-1234-1234-123412341234}" type="slidenum">
-              <a:rPr lang="en-US"/>
-              <a:t>5</a:t>
-            </a:fld>
-            <a:endParaRPr/>
-          </a:p>
-        </p:txBody>
-      </p:sp>
-    </p:spTree>
     <p:extLst>
       <p:ext uri="{BB962C8B-B14F-4D97-AF65-F5344CB8AC3E}">
         <p14:creationId xmlns:p14="http://schemas.microsoft.com/office/powerpoint/2010/main" val="1271316588"/>
@@ -2132,7 +2022,7 @@
 </p:notes>
 </file>
 
-<file path=ppt/notesSlides/notesSlide6.xml><?xml version="1.0" encoding="utf-8"?>
+<file path=ppt/notesSlides/notesSlide5.xml><?xml version="1.0" encoding="utf-8"?>
 <p:notes xmlns:a="http://schemas.openxmlformats.org/drawingml/2006/main" xmlns:r="http://schemas.openxmlformats.org/officeDocument/2006/relationships" xmlns:p="http://schemas.openxmlformats.org/presentationml/2006/main" showMasterSp="0" showMasterPhAnim="0">
   <p:cSld>
     <p:spTree>
@@ -2236,7 +2126,7 @@
 </p:notes>
 </file>
 
-<file path=ppt/notesSlides/notesSlide7.xml><?xml version="1.0" encoding="utf-8"?>
+<file path=ppt/notesSlides/notesSlide6.xml><?xml version="1.0" encoding="utf-8"?>
 <p:notes xmlns:a="http://schemas.openxmlformats.org/drawingml/2006/main" xmlns:r="http://schemas.openxmlformats.org/officeDocument/2006/relationships" xmlns:p="http://schemas.openxmlformats.org/presentationml/2006/main" showMasterSp="0" showMasterPhAnim="0">
   <p:cSld>
     <p:spTree>
@@ -2345,7 +2235,7 @@
 </p:notes>
 </file>
 
-<file path=ppt/notesSlides/notesSlide8.xml><?xml version="1.0" encoding="utf-8"?>
+<file path=ppt/notesSlides/notesSlide7.xml><?xml version="1.0" encoding="utf-8"?>
 <p:notes xmlns:a="http://schemas.openxmlformats.org/drawingml/2006/main" xmlns:r="http://schemas.openxmlformats.org/officeDocument/2006/relationships" xmlns:p="http://schemas.openxmlformats.org/presentationml/2006/main" showMasterSp="0" showMasterPhAnim="0">
   <p:cSld>
     <p:spTree>
@@ -8660,130 +8550,6 @@
   <p:cSld>
     <p:spTree>
       <p:nvGrpSpPr>
-        <p:cNvPr id="1" name="Shape 60"/>
-        <p:cNvGrpSpPr/>
-        <p:nvPr/>
-      </p:nvGrpSpPr>
-      <p:grpSpPr>
-        <a:xfrm>
-          <a:off x="0" y="0"/>
-          <a:ext cx="0" cy="0"/>
-          <a:chOff x="0" y="0"/>
-          <a:chExt cx="0" cy="0"/>
-        </a:xfrm>
-      </p:grpSpPr>
-      <p:sp>
-        <p:nvSpPr>
-          <p:cNvPr id="61" name="Google Shape;61;p2"/>
-          <p:cNvSpPr txBox="1">
-            <a:spLocks noGrp="1"/>
-          </p:cNvSpPr>
-          <p:nvPr>
-            <p:ph type="body" idx="1"/>
-          </p:nvPr>
-        </p:nvSpPr>
-        <p:spPr>
-          <a:xfrm>
-            <a:off x="169182" y="127251"/>
-            <a:ext cx="5926817" cy="1070178"/>
-          </a:xfrm>
-          <a:prstGeom prst="rect">
-            <a:avLst/>
-          </a:prstGeom>
-          <a:noFill/>
-          <a:ln>
-            <a:noFill/>
-          </a:ln>
-        </p:spPr>
-        <p:txBody>
-          <a:bodyPr spcFirstLastPara="1" wrap="square" lIns="0" tIns="0" rIns="0" bIns="0" anchor="t" anchorCtr="0">
-            <a:noAutofit/>
-          </a:bodyPr>
-          <a:lstStyle/>
-          <a:p>
-            <a:pPr marL="0" lvl="0" indent="0" rtl="0">
-              <a:lnSpc>
-                <a:spcPct val="100000"/>
-              </a:lnSpc>
-              <a:spcBef>
-                <a:spcPts val="0"/>
-              </a:spcBef>
-              <a:spcAft>
-                <a:spcPts val="0"/>
-              </a:spcAft>
-              <a:buClr>
-                <a:schemeClr val="dk1"/>
-              </a:buClr>
-              <a:buSzPts val="4300"/>
-              <a:buNone/>
-            </a:pPr>
-            <a:r>
-              <a:rPr lang="en-US" dirty="0">
-                <a:solidFill>
-                  <a:schemeClr val="bg1"/>
-                </a:solidFill>
-              </a:rPr>
-              <a:t>MUTEvolution</a:t>
-            </a:r>
-            <a:endParaRPr dirty="0">
-              <a:solidFill>
-                <a:schemeClr val="bg1"/>
-              </a:solidFill>
-            </a:endParaRPr>
-          </a:p>
-        </p:txBody>
-      </p:sp>
-      <p:pic>
-        <p:nvPicPr>
-          <p:cNvPr id="3" name="Imagen 2">
-            <a:extLst>
-              <a:ext uri="{FF2B5EF4-FFF2-40B4-BE49-F238E27FC236}">
-                <a16:creationId xmlns:a16="http://schemas.microsoft.com/office/drawing/2014/main" id="{167D5729-9438-09B8-0182-1285583FE922}"/>
-              </a:ext>
-            </a:extLst>
-          </p:cNvPr>
-          <p:cNvPicPr>
-            <a:picLocks noChangeAspect="1"/>
-          </p:cNvPicPr>
-          <p:nvPr/>
-        </p:nvPicPr>
-        <p:blipFill>
-          <a:blip r:embed="rId4"/>
-          <a:stretch>
-            <a:fillRect/>
-          </a:stretch>
-        </p:blipFill>
-        <p:spPr>
-          <a:xfrm>
-            <a:off x="651325" y="1976161"/>
-            <a:ext cx="7240010" cy="3972479"/>
-          </a:xfrm>
-          <a:prstGeom prst="rect">
-            <a:avLst/>
-          </a:prstGeom>
-        </p:spPr>
-      </p:pic>
-    </p:spTree>
-    <p:custDataLst>
-      <p:tags r:id="rId1"/>
-    </p:custDataLst>
-    <p:extLst>
-      <p:ext uri="{BB962C8B-B14F-4D97-AF65-F5344CB8AC3E}">
-        <p14:creationId xmlns:p14="http://schemas.microsoft.com/office/powerpoint/2010/main" val="961964064"/>
-      </p:ext>
-    </p:extLst>
-  </p:cSld>
-  <p:clrMapOvr>
-    <a:masterClrMapping/>
-  </p:clrMapOvr>
-</p:sld>
-</file>
-
-<file path=ppt/slides/slide4.xml><?xml version="1.0" encoding="utf-8"?>
-<p:sld xmlns:a="http://schemas.openxmlformats.org/drawingml/2006/main" xmlns:r="http://schemas.openxmlformats.org/officeDocument/2006/relationships" xmlns:p="http://schemas.openxmlformats.org/presentationml/2006/main">
-  <p:cSld>
-    <p:spTree>
-      <p:nvGrpSpPr>
         <p:cNvPr id="1" name="Shape 67"/>
         <p:cNvGrpSpPr/>
         <p:nvPr/>
@@ -8862,8 +8628,8 @@
         </p:nvSpPr>
         <p:spPr>
           <a:xfrm>
-            <a:off x="1730643" y="1705451"/>
-            <a:ext cx="6441538" cy="3554819"/>
+            <a:off x="1730643" y="1328425"/>
+            <a:ext cx="6441538" cy="4201150"/>
           </a:xfrm>
           <a:prstGeom prst="rect">
             <a:avLst/>
@@ -8901,7 +8667,219 @@
                 <a:cs typeface="Arial"/>
                 <a:sym typeface="Arial"/>
               </a:rPr>
-              <a:t>Nuestro proyecto consiste en desarrollar un sistema de traducción de lenguaje de señas a texto utilizando técnicas de inteligencia artificial. El problema que buscamos resolver es la barrera de comunicación que enfrentan las personas sordas y con discapacidad auditiva al interactuar con la sociedad oyente. Actualmente, existen pocas soluciones efectivas y accesibles que permitan una comunicación fluida entre ambas comunidades. Esta barrera limita la inclusión social, la participación en la educación, el empleo y otras áreas cruciales de la vida diaria para las personas con discapacidades auditivas. “SIGNBUDDY" busca ofrecer una solución innovadora y accesible que facilite esta traducción en tiempo real, mejorando significativamente la comunicación y promoviendo la igualdad de oportunidades.</a:t>
+              <a:t>El problema que buscamos resolver es la </a:t>
+            </a:r>
+            <a:r>
+              <a:rPr lang="es-PA" sz="1400" b="1" dirty="0">
+                <a:solidFill>
+                  <a:schemeClr val="tx1"/>
+                </a:solidFill>
+                <a:latin typeface="Arial"/>
+                <a:ea typeface="Arial"/>
+                <a:cs typeface="Arial"/>
+                <a:sym typeface="Arial"/>
+              </a:rPr>
+              <a:t>barrera de comunicación </a:t>
+            </a:r>
+            <a:r>
+              <a:rPr lang="es-PA" sz="1400" dirty="0">
+                <a:solidFill>
+                  <a:schemeClr val="tx1"/>
+                </a:solidFill>
+                <a:latin typeface="Arial"/>
+                <a:ea typeface="Arial"/>
+                <a:cs typeface="Arial"/>
+                <a:sym typeface="Arial"/>
+              </a:rPr>
+              <a:t>que enfrentan las personas sordas y con discapacidad auditiva al interactuar con la sociedad oyente. </a:t>
+            </a:r>
+          </a:p>
+          <a:p>
+            <a:pPr marL="0" marR="0" lvl="0" indent="0" algn="just" rtl="0">
+              <a:lnSpc>
+                <a:spcPct val="150000"/>
+              </a:lnSpc>
+              <a:spcBef>
+                <a:spcPts val="0"/>
+              </a:spcBef>
+              <a:spcAft>
+                <a:spcPts val="0"/>
+              </a:spcAft>
+              <a:buNone/>
+            </a:pPr>
+            <a:endParaRPr lang="es-PA" dirty="0">
+              <a:solidFill>
+                <a:schemeClr val="tx1"/>
+              </a:solidFill>
+            </a:endParaRPr>
+          </a:p>
+          <a:p>
+            <a:pPr marL="0" marR="0" lvl="0" indent="0" algn="just" rtl="0">
+              <a:lnSpc>
+                <a:spcPct val="150000"/>
+              </a:lnSpc>
+              <a:spcBef>
+                <a:spcPts val="0"/>
+              </a:spcBef>
+              <a:spcAft>
+                <a:spcPts val="0"/>
+              </a:spcAft>
+              <a:buNone/>
+            </a:pPr>
+            <a:r>
+              <a:rPr lang="es-PA" sz="1400" dirty="0">
+                <a:solidFill>
+                  <a:schemeClr val="tx1"/>
+                </a:solidFill>
+                <a:latin typeface="Arial"/>
+                <a:ea typeface="Arial"/>
+                <a:cs typeface="Arial"/>
+                <a:sym typeface="Arial"/>
+              </a:rPr>
+              <a:t>Actualmente, existen </a:t>
+            </a:r>
+            <a:r>
+              <a:rPr lang="es-PA" sz="1400" b="1" dirty="0">
+                <a:solidFill>
+                  <a:schemeClr val="tx1"/>
+                </a:solidFill>
+                <a:latin typeface="Arial"/>
+                <a:ea typeface="Arial"/>
+                <a:cs typeface="Arial"/>
+                <a:sym typeface="Arial"/>
+              </a:rPr>
+              <a:t>pocas soluciones efectivas</a:t>
+            </a:r>
+            <a:r>
+              <a:rPr lang="es-PA" sz="1400" dirty="0">
+                <a:solidFill>
+                  <a:schemeClr val="tx1"/>
+                </a:solidFill>
+                <a:latin typeface="Arial"/>
+                <a:ea typeface="Arial"/>
+                <a:cs typeface="Arial"/>
+                <a:sym typeface="Arial"/>
+              </a:rPr>
+              <a:t> y accesibles que permitan una comunicación fluida entre ambas comunidades. </a:t>
+            </a:r>
+          </a:p>
+          <a:p>
+            <a:pPr marL="0" marR="0" lvl="0" indent="0" algn="just" rtl="0">
+              <a:lnSpc>
+                <a:spcPct val="150000"/>
+              </a:lnSpc>
+              <a:spcBef>
+                <a:spcPts val="0"/>
+              </a:spcBef>
+              <a:spcAft>
+                <a:spcPts val="0"/>
+              </a:spcAft>
+              <a:buNone/>
+            </a:pPr>
+            <a:endParaRPr lang="es-PA" dirty="0">
+              <a:solidFill>
+                <a:schemeClr val="tx1"/>
+              </a:solidFill>
+            </a:endParaRPr>
+          </a:p>
+          <a:p>
+            <a:pPr marL="0" marR="0" lvl="0" indent="0" algn="just" rtl="0">
+              <a:lnSpc>
+                <a:spcPct val="150000"/>
+              </a:lnSpc>
+              <a:spcBef>
+                <a:spcPts val="0"/>
+              </a:spcBef>
+              <a:spcAft>
+                <a:spcPts val="0"/>
+              </a:spcAft>
+              <a:buNone/>
+            </a:pPr>
+            <a:r>
+              <a:rPr lang="es-PA" sz="1400" dirty="0">
+                <a:solidFill>
+                  <a:schemeClr val="tx1"/>
+                </a:solidFill>
+                <a:latin typeface="Arial"/>
+                <a:ea typeface="Arial"/>
+                <a:cs typeface="Arial"/>
+                <a:sym typeface="Arial"/>
+              </a:rPr>
+              <a:t>Esta barrera limita la </a:t>
+            </a:r>
+            <a:r>
+              <a:rPr lang="es-PA" sz="1400" b="1" dirty="0">
+                <a:solidFill>
+                  <a:schemeClr val="tx1"/>
+                </a:solidFill>
+                <a:latin typeface="Arial"/>
+                <a:ea typeface="Arial"/>
+                <a:cs typeface="Arial"/>
+                <a:sym typeface="Arial"/>
+              </a:rPr>
+              <a:t>inclusión social</a:t>
+            </a:r>
+            <a:r>
+              <a:rPr lang="es-PA" sz="1400" dirty="0">
+                <a:solidFill>
+                  <a:schemeClr val="tx1"/>
+                </a:solidFill>
+                <a:latin typeface="Arial"/>
+                <a:ea typeface="Arial"/>
+                <a:cs typeface="Arial"/>
+                <a:sym typeface="Arial"/>
+              </a:rPr>
+              <a:t>, la participación en la educación, el empleo y otras áreas cruciales de la vida diaria para las personas con discapacidades auditivas. </a:t>
+            </a:r>
+          </a:p>
+          <a:p>
+            <a:pPr marL="0" marR="0" lvl="0" indent="0" algn="just" rtl="0">
+              <a:lnSpc>
+                <a:spcPct val="150000"/>
+              </a:lnSpc>
+              <a:spcBef>
+                <a:spcPts val="0"/>
+              </a:spcBef>
+              <a:spcAft>
+                <a:spcPts val="0"/>
+              </a:spcAft>
+              <a:buNone/>
+            </a:pPr>
+            <a:r>
+              <a:rPr lang="es-PA" sz="1400" dirty="0">
+                <a:solidFill>
+                  <a:schemeClr val="tx1"/>
+                </a:solidFill>
+                <a:latin typeface="Arial"/>
+                <a:ea typeface="Arial"/>
+                <a:cs typeface="Arial"/>
+                <a:sym typeface="Arial"/>
+              </a:rPr>
+              <a:t>“SIGNBUDDY" busca ofrecer una solución innovadora y accesible que facilite esta </a:t>
+            </a:r>
+            <a:r>
+              <a:rPr lang="es-PA" sz="1400" b="1" dirty="0">
+                <a:solidFill>
+                  <a:schemeClr val="tx1"/>
+                </a:solidFill>
+                <a:latin typeface="Arial"/>
+                <a:ea typeface="Arial"/>
+                <a:cs typeface="Arial"/>
+                <a:sym typeface="Arial"/>
+              </a:rPr>
+              <a:t>traducción en tiempo real</a:t>
+            </a:r>
+            <a:r>
+              <a:rPr lang="es-PA" sz="1400" dirty="0">
+                <a:solidFill>
+                  <a:schemeClr val="tx1"/>
+                </a:solidFill>
+                <a:latin typeface="Arial"/>
+                <a:ea typeface="Arial"/>
+                <a:cs typeface="Arial"/>
+                <a:sym typeface="Arial"/>
+              </a:rPr>
+              <a:t>, mejorando significativamente la comunicación y promoviendo la igualdad de oportunidades.</a:t>
             </a:r>
             <a:endParaRPr dirty="0">
               <a:solidFill>
@@ -8986,7 +8964,7 @@
 </p:sld>
 </file>
 
-<file path=ppt/slides/slide5.xml><?xml version="1.0" encoding="utf-8"?>
+<file path=ppt/slides/slide4.xml><?xml version="1.0" encoding="utf-8"?>
 <p:sld xmlns:a="http://schemas.openxmlformats.org/drawingml/2006/main" xmlns:r="http://schemas.openxmlformats.org/officeDocument/2006/relationships" xmlns:p="http://schemas.openxmlformats.org/presentationml/2006/main">
   <p:cSld>
     <p:spTree>
@@ -9788,7 +9766,7 @@
 </p:sld>
 </file>
 
-<file path=ppt/slides/slide6.xml><?xml version="1.0" encoding="utf-8"?>
+<file path=ppt/slides/slide5.xml><?xml version="1.0" encoding="utf-8"?>
 <p:sld xmlns:a="http://schemas.openxmlformats.org/drawingml/2006/main" xmlns:r="http://schemas.openxmlformats.org/officeDocument/2006/relationships" xmlns:p="http://schemas.openxmlformats.org/presentationml/2006/main">
   <p:cSld>
     <p:spTree>
@@ -9805,230 +9783,6 @@
           <a:chExt cx="0" cy="0"/>
         </a:xfrm>
       </p:grpSpPr>
-      <p:sp>
-        <p:nvSpPr>
-          <p:cNvPr id="86" name="Google Shape;86;p4"/>
-          <p:cNvSpPr txBox="1">
-            <a:spLocks noGrp="1"/>
-          </p:cNvSpPr>
-          <p:nvPr>
-            <p:ph type="body" idx="5"/>
-          </p:nvPr>
-        </p:nvSpPr>
-        <p:spPr>
-          <a:xfrm>
-            <a:off x="449467" y="1192976"/>
-            <a:ext cx="6206972" cy="4268312"/>
-          </a:xfrm>
-          <a:prstGeom prst="rect">
-            <a:avLst/>
-          </a:prstGeom>
-          <a:noFill/>
-          <a:ln>
-            <a:noFill/>
-          </a:ln>
-        </p:spPr>
-        <p:txBody>
-          <a:bodyPr spcFirstLastPara="1" wrap="square" lIns="0" tIns="0" rIns="0" bIns="0" anchor="t" anchorCtr="0">
-            <a:noAutofit/>
-          </a:bodyPr>
-          <a:lstStyle/>
-          <a:p>
-            <a:pPr marL="177747" lvl="0" indent="-177747" algn="l" rtl="0">
-              <a:lnSpc>
-                <a:spcPct val="128571"/>
-              </a:lnSpc>
-              <a:spcBef>
-                <a:spcPts val="0"/>
-              </a:spcBef>
-              <a:spcAft>
-                <a:spcPts val="0"/>
-              </a:spcAft>
-              <a:buClr>
-                <a:srgbClr val="262626"/>
-              </a:buClr>
-              <a:buSzPts val="1470"/>
-              <a:buFont typeface="Arial"/>
-              <a:buChar char="•"/>
-            </a:pPr>
-            <a:r>
-              <a:rPr lang="en-US" dirty="0" err="1"/>
-              <a:t>Librerías</a:t>
-            </a:r>
-            <a:r>
-              <a:rPr lang="en-US" dirty="0"/>
-              <a:t>: </a:t>
-            </a:r>
-          </a:p>
-          <a:p>
-            <a:pPr marL="634947" lvl="1" indent="-177747">
-              <a:lnSpc>
-                <a:spcPct val="128571"/>
-              </a:lnSpc>
-              <a:spcBef>
-                <a:spcPts val="0"/>
-              </a:spcBef>
-              <a:buSzPts val="1470"/>
-            </a:pPr>
-            <a:r>
-              <a:rPr lang="en-US" dirty="0"/>
-              <a:t>OpenCV</a:t>
-            </a:r>
-          </a:p>
-          <a:p>
-            <a:pPr marL="634947" lvl="1" indent="-177747">
-              <a:lnSpc>
-                <a:spcPct val="128571"/>
-              </a:lnSpc>
-              <a:spcBef>
-                <a:spcPts val="0"/>
-              </a:spcBef>
-              <a:buSzPts val="1470"/>
-            </a:pPr>
-            <a:r>
-              <a:rPr lang="en-US" dirty="0" err="1"/>
-              <a:t>Numpy</a:t>
-            </a:r>
-            <a:endParaRPr lang="en-US" dirty="0"/>
-          </a:p>
-          <a:p>
-            <a:pPr marL="634947" lvl="1" indent="-177747">
-              <a:lnSpc>
-                <a:spcPct val="128571"/>
-              </a:lnSpc>
-              <a:spcBef>
-                <a:spcPts val="0"/>
-              </a:spcBef>
-              <a:buSzPts val="1470"/>
-            </a:pPr>
-            <a:r>
-              <a:rPr lang="en-US" dirty="0" err="1"/>
-              <a:t>Mediapipe</a:t>
-            </a:r>
-            <a:endParaRPr lang="en-US" dirty="0"/>
-          </a:p>
-          <a:p>
-            <a:pPr marL="634947" lvl="1" indent="-177747">
-              <a:lnSpc>
-                <a:spcPct val="128571"/>
-              </a:lnSpc>
-              <a:spcBef>
-                <a:spcPts val="0"/>
-              </a:spcBef>
-              <a:buSzPts val="1470"/>
-            </a:pPr>
-            <a:r>
-              <a:rPr lang="en-US" dirty="0" err="1"/>
-              <a:t>Tensorflow</a:t>
-            </a:r>
-            <a:endParaRPr lang="en-US" dirty="0"/>
-          </a:p>
-          <a:p>
-            <a:pPr marL="634947" lvl="1" indent="-177747">
-              <a:lnSpc>
-                <a:spcPct val="128571"/>
-              </a:lnSpc>
-              <a:spcBef>
-                <a:spcPts val="0"/>
-              </a:spcBef>
-              <a:buSzPts val="1470"/>
-            </a:pPr>
-            <a:r>
-              <a:rPr lang="en-US" dirty="0"/>
-              <a:t>Collections</a:t>
-            </a:r>
-          </a:p>
-          <a:p>
-            <a:pPr marL="634947" lvl="1" indent="-177747">
-              <a:lnSpc>
-                <a:spcPct val="128571"/>
-              </a:lnSpc>
-              <a:spcBef>
-                <a:spcPts val="0"/>
-              </a:spcBef>
-              <a:buSzPts val="1470"/>
-            </a:pPr>
-            <a:r>
-              <a:rPr lang="en-US" dirty="0"/>
-              <a:t>OS</a:t>
-            </a:r>
-          </a:p>
-          <a:p>
-            <a:pPr marL="634947" lvl="1" indent="-177747">
-              <a:lnSpc>
-                <a:spcPct val="128571"/>
-              </a:lnSpc>
-              <a:spcBef>
-                <a:spcPts val="0"/>
-              </a:spcBef>
-              <a:buSzPts val="1470"/>
-            </a:pPr>
-            <a:r>
-              <a:rPr lang="en-US" dirty="0"/>
-              <a:t>Time</a:t>
-            </a:r>
-          </a:p>
-          <a:p>
-            <a:pPr marL="634947" lvl="1" indent="-177747">
-              <a:lnSpc>
-                <a:spcPct val="128571"/>
-              </a:lnSpc>
-              <a:spcBef>
-                <a:spcPts val="0"/>
-              </a:spcBef>
-              <a:buSzPts val="1470"/>
-            </a:pPr>
-            <a:r>
-              <a:rPr lang="en-US" dirty="0"/>
-              <a:t>Socket</a:t>
-            </a:r>
-          </a:p>
-          <a:p>
-            <a:pPr marL="177747" lvl="0" indent="-177747" algn="l" rtl="0">
-              <a:lnSpc>
-                <a:spcPct val="128571"/>
-              </a:lnSpc>
-              <a:spcBef>
-                <a:spcPts val="0"/>
-              </a:spcBef>
-              <a:spcAft>
-                <a:spcPts val="0"/>
-              </a:spcAft>
-              <a:buClr>
-                <a:srgbClr val="262626"/>
-              </a:buClr>
-              <a:buSzPts val="1470"/>
-              <a:buFont typeface="Arial"/>
-              <a:buChar char="•"/>
-            </a:pPr>
-            <a:r>
-              <a:rPr lang="en-US" dirty="0" err="1"/>
-              <a:t>Modelo</a:t>
-            </a:r>
-            <a:r>
-              <a:rPr lang="en-US" dirty="0"/>
-              <a:t> </a:t>
-            </a:r>
-            <a:r>
-              <a:rPr lang="en-US" dirty="0" err="1"/>
-              <a:t>en</a:t>
-            </a:r>
-            <a:r>
-              <a:rPr lang="en-US" dirty="0"/>
-              <a:t> base a red </a:t>
-            </a:r>
-            <a:r>
-              <a:rPr lang="en-US" dirty="0" err="1"/>
-              <a:t>secuencial</a:t>
-            </a:r>
-            <a:r>
-              <a:rPr lang="en-US" dirty="0"/>
-              <a:t> con LSTM</a:t>
-            </a:r>
-            <a:endParaRPr dirty="0"/>
-          </a:p>
-        </p:txBody>
-      </p:sp>
       <p:sp>
         <p:nvSpPr>
           <p:cNvPr id="88" name="Google Shape;88;p4"/>
@@ -10072,7 +9826,7 @@
               <a:buNone/>
             </a:pPr>
             <a:r>
-              <a:rPr lang="en-US" sz="2800" dirty="0" err="1">
+              <a:rPr lang="es-ES" sz="2800" dirty="0">
                 <a:solidFill>
                   <a:schemeClr val="lt1"/>
                 </a:solidFill>
@@ -10081,7 +9835,7 @@
                 <a:cs typeface="Arial"/>
                 <a:sym typeface="Arial"/>
               </a:rPr>
-              <a:t>Herramientas</a:t>
+              <a:t>Resultados</a:t>
             </a:r>
             <a:endParaRPr sz="2800" dirty="0">
               <a:solidFill>
@@ -10161,143 +9915,85 @@
       </p:sp>
       <p:pic>
         <p:nvPicPr>
-          <p:cNvPr id="1026" name="Picture 2" descr="5 cursos para aprender TensorFlow e Machine Learning (ML) | MANDIC">
+          <p:cNvPr id="4" name="Imagen 3">
             <a:extLst>
               <a:ext uri="{FF2B5EF4-FFF2-40B4-BE49-F238E27FC236}">
-                <a16:creationId xmlns:a16="http://schemas.microsoft.com/office/drawing/2014/main" id="{792057AF-D9A3-78A7-572A-81909BA2F369}"/>
+                <a16:creationId xmlns:a16="http://schemas.microsoft.com/office/drawing/2014/main" id="{9A432B5B-1328-D234-38EF-ABAA07628DD0}"/>
               </a:ext>
             </a:extLst>
           </p:cNvPr>
           <p:cNvPicPr>
-            <a:picLocks noChangeAspect="1" noChangeArrowheads="1"/>
+            <a:picLocks noChangeAspect="1"/>
           </p:cNvPicPr>
           <p:nvPr/>
         </p:nvPicPr>
         <p:blipFill>
-          <a:blip r:embed="rId4">
-            <a:extLst>
-              <a:ext uri="{28A0092B-C50C-407E-A947-70E740481C1C}">
-                <a14:useLocalDpi xmlns:a14="http://schemas.microsoft.com/office/drawing/2010/main" val="0"/>
-              </a:ext>
-            </a:extLst>
-          </a:blip>
-          <a:srcRect/>
+          <a:blip r:embed="rId4"/>
           <a:stretch>
             <a:fillRect/>
           </a:stretch>
         </p:blipFill>
-        <p:spPr bwMode="auto">
+        <p:spPr>
           <a:xfrm>
-            <a:off x="449467" y="4130299"/>
-            <a:ext cx="3942031" cy="1971016"/>
+            <a:off x="632146" y="1242974"/>
+            <a:ext cx="3673466" cy="2933256"/>
           </a:xfrm>
           <a:prstGeom prst="rect">
             <a:avLst/>
           </a:prstGeom>
-          <a:noFill/>
-          <a:extLst>
-            <a:ext uri="{909E8E84-426E-40DD-AFC4-6F175D3DCCD1}">
-              <a14:hiddenFill xmlns:a14="http://schemas.microsoft.com/office/drawing/2010/main">
-                <a:solidFill>
-                  <a:srgbClr val="FFFFFF"/>
-                </a:solidFill>
-              </a14:hiddenFill>
-            </a:ext>
-          </a:extLst>
+          <a:ln>
+            <a:noFill/>
+          </a:ln>
+          <a:effectLst>
+            <a:outerShdw blurRad="292100" dist="139700" dir="2700000" algn="tl" rotWithShape="0">
+              <a:srgbClr val="333333">
+                <a:alpha val="65000"/>
+              </a:srgbClr>
+            </a:outerShdw>
+          </a:effectLst>
         </p:spPr>
       </p:pic>
       <p:pic>
         <p:nvPicPr>
-          <p:cNvPr id="1028" name="Picture 4" descr="【MediaPipe】ARに使えるオープンソース機械学習 | アルファビット">
+          <p:cNvPr id="8" name="Imagen 7">
             <a:extLst>
               <a:ext uri="{FF2B5EF4-FFF2-40B4-BE49-F238E27FC236}">
-                <a16:creationId xmlns:a16="http://schemas.microsoft.com/office/drawing/2014/main" id="{45BB5571-159B-1703-67C9-2F36555A6090}"/>
+                <a16:creationId xmlns:a16="http://schemas.microsoft.com/office/drawing/2014/main" id="{03B3E68E-EF72-27A1-AE26-FC980F95FEDA}"/>
               </a:ext>
             </a:extLst>
           </p:cNvPr>
           <p:cNvPicPr>
-            <a:picLocks noChangeAspect="1" noChangeArrowheads="1"/>
+            <a:picLocks noChangeAspect="1"/>
           </p:cNvPicPr>
           <p:nvPr/>
         </p:nvPicPr>
         <p:blipFill>
-          <a:blip r:embed="rId5">
-            <a:extLst>
-              <a:ext uri="{28A0092B-C50C-407E-A947-70E740481C1C}">
-                <a14:useLocalDpi xmlns:a14="http://schemas.microsoft.com/office/drawing/2010/main" val="0"/>
-              </a:ext>
-            </a:extLst>
-          </a:blip>
-          <a:srcRect/>
+          <a:blip r:embed="rId5"/>
           <a:stretch>
             <a:fillRect/>
           </a:stretch>
         </p:blipFill>
-        <p:spPr bwMode="auto">
+        <p:spPr>
           <a:xfrm>
-            <a:off x="5980671" y="3534643"/>
-            <a:ext cx="2523310" cy="2523310"/>
+            <a:off x="4710861" y="4176230"/>
+            <a:ext cx="4559818" cy="1632671"/>
           </a:xfrm>
-          <a:prstGeom prst="rect">
-            <a:avLst/>
+          <a:prstGeom prst="roundRect">
+            <a:avLst>
+              <a:gd name="adj" fmla="val 8594"/>
+            </a:avLst>
           </a:prstGeom>
-          <a:noFill/>
-          <a:extLst>
-            <a:ext uri="{909E8E84-426E-40DD-AFC4-6F175D3DCCD1}">
-              <a14:hiddenFill xmlns:a14="http://schemas.microsoft.com/office/drawing/2010/main">
-                <a:solidFill>
-                  <a:srgbClr val="FFFFFF"/>
-                </a:solidFill>
-              </a14:hiddenFill>
-            </a:ext>
-          </a:extLst>
-        </p:spPr>
-      </p:pic>
-      <p:pic>
-        <p:nvPicPr>
-          <p:cNvPr id="1030" name="Picture 6" descr="NumPy CheatSheet. NumPy stands for Numerical Python. | by Aditri ...">
-            <a:extLst>
-              <a:ext uri="{FF2B5EF4-FFF2-40B4-BE49-F238E27FC236}">
-                <a16:creationId xmlns:a16="http://schemas.microsoft.com/office/drawing/2014/main" id="{4D4DB313-B37F-165F-6014-A8E17D5153D8}"/>
-              </a:ext>
-            </a:extLst>
-          </p:cNvPr>
-          <p:cNvPicPr>
-            <a:picLocks noChangeAspect="1" noChangeArrowheads="1"/>
-          </p:cNvPicPr>
-          <p:nvPr/>
-        </p:nvPicPr>
-        <p:blipFill>
-          <a:blip r:embed="rId6">
-            <a:extLst>
-              <a:ext uri="{28A0092B-C50C-407E-A947-70E740481C1C}">
-                <a14:useLocalDpi xmlns:a14="http://schemas.microsoft.com/office/drawing/2010/main" val="0"/>
-              </a:ext>
-            </a:extLst>
-          </a:blip>
-          <a:srcRect/>
-          <a:stretch>
-            <a:fillRect/>
-          </a:stretch>
-        </p:blipFill>
-        <p:spPr bwMode="auto">
-          <a:xfrm>
-            <a:off x="4182601" y="971663"/>
-            <a:ext cx="5270757" cy="2108303"/>
-          </a:xfrm>
-          <a:prstGeom prst="rect">
-            <a:avLst/>
-          </a:prstGeom>
-          <a:noFill/>
-          <a:extLst>
-            <a:ext uri="{909E8E84-426E-40DD-AFC4-6F175D3DCCD1}">
-              <a14:hiddenFill xmlns:a14="http://schemas.microsoft.com/office/drawing/2010/main">
-                <a:solidFill>
-                  <a:srgbClr val="FFFFFF"/>
-                </a:solidFill>
-              </a14:hiddenFill>
-            </a:ext>
-          </a:extLst>
+          <a:solidFill>
+            <a:srgbClr val="FFFFFF">
+              <a:shade val="85000"/>
+            </a:srgbClr>
+          </a:solidFill>
+          <a:ln>
+            <a:noFill/>
+          </a:ln>
+          <a:effectLst>
+            <a:reflection blurRad="12700" stA="38000" endPos="28000" dist="5000" dir="5400000" sy="-100000" algn="bl" rotWithShape="0"/>
+          </a:effectLst>
         </p:spPr>
       </p:pic>
     </p:spTree>
@@ -10311,7 +10007,7 @@
 </p:sld>
 </file>
 
-<file path=ppt/slides/slide7.xml><?xml version="1.0" encoding="utf-8"?>
+<file path=ppt/slides/slide6.xml><?xml version="1.0" encoding="utf-8"?>
 <p:sld xmlns:a="http://schemas.openxmlformats.org/drawingml/2006/main" xmlns:r="http://schemas.openxmlformats.org/officeDocument/2006/relationships" xmlns:p="http://schemas.openxmlformats.org/presentationml/2006/main">
   <p:cSld>
     <p:spTree>
@@ -10813,7 +10509,7 @@
 </p:sld>
 </file>
 
-<file path=ppt/slides/slide8.xml><?xml version="1.0" encoding="utf-8"?>
+<file path=ppt/slides/slide7.xml><?xml version="1.0" encoding="utf-8"?>
 <p:sld xmlns:a="http://schemas.openxmlformats.org/drawingml/2006/main" xmlns:r="http://schemas.openxmlformats.org/officeDocument/2006/relationships" xmlns:p="http://schemas.openxmlformats.org/presentationml/2006/main">
   <p:cSld>
     <p:spTree>
@@ -10877,7 +10573,7 @@
 
 <file path=ppt/tags/tag4.xml><?xml version="1.0" encoding="utf-8"?>
 <p:tagLst xmlns:a="http://schemas.openxmlformats.org/drawingml/2006/main" xmlns:r="http://schemas.openxmlformats.org/officeDocument/2006/relationships" xmlns:p="http://schemas.openxmlformats.org/presentationml/2006/main">
-  <p:tag name="GENSWF_SLIDE_UID" val="{875FCD4C-21D1-40F8-AE74-0E6331AD3514}:257"/>
+  <p:tag name="GENSWF_SLIDE_UID" val="{D64D573C-6EAB-4E20-91DB-702E2CBC137C}:258"/>
 </p:tagLst>
 </file>
 
@@ -10889,7 +10585,7 @@
 
 <file path=ppt/tags/tag6.xml><?xml version="1.0" encoding="utf-8"?>
 <p:tagLst xmlns:a="http://schemas.openxmlformats.org/drawingml/2006/main" xmlns:r="http://schemas.openxmlformats.org/officeDocument/2006/relationships" xmlns:p="http://schemas.openxmlformats.org/presentationml/2006/main">
-  <p:tag name="GENSWF_SLIDE_UID" val="{D64D573C-6EAB-4E20-91DB-702E2CBC137C}:258"/>
+  <p:tag name="GENSWF_SLIDE_UID" val="{25D0D7AF-CD1D-4B22-B9FB-FEB2F16ED37B}:259"/>
 </p:tagLst>
 </file>
 
@@ -10900,12 +10596,6 @@
 </file>
 
 <file path=ppt/tags/tag8.xml><?xml version="1.0" encoding="utf-8"?>
-<p:tagLst xmlns:a="http://schemas.openxmlformats.org/drawingml/2006/main" xmlns:r="http://schemas.openxmlformats.org/officeDocument/2006/relationships" xmlns:p="http://schemas.openxmlformats.org/presentationml/2006/main">
-  <p:tag name="GENSWF_SLIDE_UID" val="{25D0D7AF-CD1D-4B22-B9FB-FEB2F16ED37B}:259"/>
-</p:tagLst>
-</file>
-
-<file path=ppt/tags/tag9.xml><?xml version="1.0" encoding="utf-8"?>
 <p:tagLst xmlns:a="http://schemas.openxmlformats.org/drawingml/2006/main" xmlns:r="http://schemas.openxmlformats.org/officeDocument/2006/relationships" xmlns:p="http://schemas.openxmlformats.org/presentationml/2006/main">
   <p:tag name="GENSWF_SLIDE_UID" val="{0F8749A0-28C9-4539-9208-597D833BCFDC}:260"/>
 </p:tagLst>
@@ -11474,20 +11164,20 @@
 </file>
 
 <file path=customXml/item1.xml><?xml version="1.0" encoding="utf-8"?>
-<p:properties xmlns:p="http://schemas.microsoft.com/office/2006/metadata/properties" xmlns:xsi="http://www.w3.org/2001/XMLSchema-instance" xmlns:pc="http://schemas.microsoft.com/office/infopath/2007/PartnerControls">
-  <documentManagement>
-    <_activity xmlns="d2a3d6cb-540e-4ad1-a16e-a28c444da719" xsi:nil="true"/>
-  </documentManagement>
-</p:properties>
-</file>
-
-<file path=customXml/item2.xml><?xml version="1.0" encoding="utf-8"?>
 <?mso-contentType ?>
 <FormTemplates xmlns="http://schemas.microsoft.com/sharepoint/v3/contenttype/forms">
   <Display>DocumentLibraryForm</Display>
   <Edit>DocumentLibraryForm</Edit>
   <New>DocumentLibraryForm</New>
 </FormTemplates>
+</file>
+
+<file path=customXml/item2.xml><?xml version="1.0" encoding="utf-8"?>
+<p:properties xmlns:p="http://schemas.microsoft.com/office/2006/metadata/properties" xmlns:xsi="http://www.w3.org/2001/XMLSchema-instance" xmlns:pc="http://schemas.microsoft.com/office/infopath/2007/PartnerControls">
+  <documentManagement>
+    <_activity xmlns="d2a3d6cb-540e-4ad1-a16e-a28c444da719" xsi:nil="true"/>
+  </documentManagement>
+</p:properties>
 </file>
 
 <file path=customXml/item3.xml><?xml version="1.0" encoding="utf-8"?>
@@ -11704,6 +11394,14 @@
 </file>
 
 <file path=customXml/itemProps1.xml><?xml version="1.0" encoding="utf-8"?>
+<ds:datastoreItem xmlns:ds="http://schemas.openxmlformats.org/officeDocument/2006/customXml" ds:itemID="{948DA585-0A04-45A1-9843-7E46348BF304}">
+  <ds:schemaRefs>
+    <ds:schemaRef ds:uri="http://schemas.microsoft.com/sharepoint/v3/contenttype/forms"/>
+  </ds:schemaRefs>
+</ds:datastoreItem>
+</file>
+
+<file path=customXml/itemProps2.xml><?xml version="1.0" encoding="utf-8"?>
 <ds:datastoreItem xmlns:ds="http://schemas.openxmlformats.org/officeDocument/2006/customXml" ds:itemID="{ED3B78AD-C4D6-4711-9F2F-8BA343B66247}">
   <ds:schemaRefs>
     <ds:schemaRef ds:uri="585cda84-07e6-4aea-863b-f6b13e14a7be"/>
@@ -11716,14 +11414,6 @@
     <ds:schemaRef ds:uri="http://schemas.microsoft.com/office/infopath/2007/PartnerControls"/>
     <ds:schemaRef ds:uri="http://schemas.openxmlformats.org/package/2006/metadata/core-properties"/>
     <ds:schemaRef ds:uri="http://www.w3.org/XML/1998/namespace"/>
-  </ds:schemaRefs>
-</ds:datastoreItem>
-</file>
-
-<file path=customXml/itemProps2.xml><?xml version="1.0" encoding="utf-8"?>
-<ds:datastoreItem xmlns:ds="http://schemas.openxmlformats.org/officeDocument/2006/customXml" ds:itemID="{948DA585-0A04-45A1-9843-7E46348BF304}">
-  <ds:schemaRefs>
-    <ds:schemaRef ds:uri="http://schemas.microsoft.com/sharepoint/v3/contenttype/forms"/>
   </ds:schemaRefs>
 </ds:datastoreItem>
 </file>

</xml_diff>